<commit_message>
Update the use sos within sos notebook video
</commit_message>
<xml_diff>
--- a/src/videos/sos_and_sos_notebook.pptx
+++ b/src/videos/sos_and_sos_notebook.pptx
@@ -106,7 +106,7 @@
   </p:defaultTextStyle>
   <p:extLst>
     <p:ext uri="{EFAFB233-063F-42B5-8137-9DF3F51BA10A}">
-      <p15:sldGuideLst xmlns:p15="http://schemas.microsoft.com/office/powerpoint/2012/main" xmlns="">
+      <p15:sldGuideLst xmlns:p15="http://schemas.microsoft.com/office/powerpoint/2012/main">
         <p15:guide id="1" orient="horz" pos="1620">
           <p15:clr>
             <a:srgbClr val="A4A3A4"/>
@@ -304,7 +304,7 @@
           <a:p>
             <a:fld id="{0E7CC0F2-DA42-B046-B261-A309B05013EA}" type="datetimeFigureOut">
               <a:rPr lang="en-US" smtClean="0"/>
-              <a:t>10/18/17</a:t>
+              <a:t>11/16/17</a:t>
             </a:fld>
             <a:endParaRPr lang="en-US"/>
           </a:p>
@@ -474,7 +474,7 @@
           <a:p>
             <a:fld id="{0E7CC0F2-DA42-B046-B261-A309B05013EA}" type="datetimeFigureOut">
               <a:rPr lang="en-US" smtClean="0"/>
-              <a:t>10/18/17</a:t>
+              <a:t>11/16/17</a:t>
             </a:fld>
             <a:endParaRPr lang="en-US"/>
           </a:p>
@@ -654,7 +654,7 @@
           <a:p>
             <a:fld id="{0E7CC0F2-DA42-B046-B261-A309B05013EA}" type="datetimeFigureOut">
               <a:rPr lang="en-US" smtClean="0"/>
-              <a:t>10/18/17</a:t>
+              <a:t>11/16/17</a:t>
             </a:fld>
             <a:endParaRPr lang="en-US"/>
           </a:p>
@@ -824,7 +824,7 @@
           <a:p>
             <a:fld id="{0E7CC0F2-DA42-B046-B261-A309B05013EA}" type="datetimeFigureOut">
               <a:rPr lang="en-US" smtClean="0"/>
-              <a:t>10/18/17</a:t>
+              <a:t>11/16/17</a:t>
             </a:fld>
             <a:endParaRPr lang="en-US"/>
           </a:p>
@@ -1070,7 +1070,7 @@
           <a:p>
             <a:fld id="{0E7CC0F2-DA42-B046-B261-A309B05013EA}" type="datetimeFigureOut">
               <a:rPr lang="en-US" smtClean="0"/>
-              <a:t>10/18/17</a:t>
+              <a:t>11/16/17</a:t>
             </a:fld>
             <a:endParaRPr lang="en-US"/>
           </a:p>
@@ -1358,7 +1358,7 @@
           <a:p>
             <a:fld id="{0E7CC0F2-DA42-B046-B261-A309B05013EA}" type="datetimeFigureOut">
               <a:rPr lang="en-US" smtClean="0"/>
-              <a:t>10/18/17</a:t>
+              <a:t>11/16/17</a:t>
             </a:fld>
             <a:endParaRPr lang="en-US"/>
           </a:p>
@@ -1785,7 +1785,7 @@
           <a:p>
             <a:fld id="{0E7CC0F2-DA42-B046-B261-A309B05013EA}" type="datetimeFigureOut">
               <a:rPr lang="en-US" smtClean="0"/>
-              <a:t>10/18/17</a:t>
+              <a:t>11/16/17</a:t>
             </a:fld>
             <a:endParaRPr lang="en-US"/>
           </a:p>
@@ -1903,7 +1903,7 @@
           <a:p>
             <a:fld id="{0E7CC0F2-DA42-B046-B261-A309B05013EA}" type="datetimeFigureOut">
               <a:rPr lang="en-US" smtClean="0"/>
-              <a:t>10/18/17</a:t>
+              <a:t>11/16/17</a:t>
             </a:fld>
             <a:endParaRPr lang="en-US"/>
           </a:p>
@@ -1998,7 +1998,7 @@
           <a:p>
             <a:fld id="{0E7CC0F2-DA42-B046-B261-A309B05013EA}" type="datetimeFigureOut">
               <a:rPr lang="en-US" smtClean="0"/>
-              <a:t>10/18/17</a:t>
+              <a:t>11/16/17</a:t>
             </a:fld>
             <a:endParaRPr lang="en-US"/>
           </a:p>
@@ -2275,7 +2275,7 @@
           <a:p>
             <a:fld id="{0E7CC0F2-DA42-B046-B261-A309B05013EA}" type="datetimeFigureOut">
               <a:rPr lang="en-US" smtClean="0"/>
-              <a:t>10/18/17</a:t>
+              <a:t>11/16/17</a:t>
             </a:fld>
             <a:endParaRPr lang="en-US"/>
           </a:p>
@@ -2528,7 +2528,7 @@
           <a:p>
             <a:fld id="{0E7CC0F2-DA42-B046-B261-A309B05013EA}" type="datetimeFigureOut">
               <a:rPr lang="en-US" smtClean="0"/>
-              <a:t>10/18/17</a:t>
+              <a:t>11/16/17</a:t>
             </a:fld>
             <a:endParaRPr lang="en-US"/>
           </a:p>
@@ -2741,7 +2741,7 @@
           <a:p>
             <a:fld id="{0E7CC0F2-DA42-B046-B261-A309B05013EA}" type="datetimeFigureOut">
               <a:rPr lang="en-US" smtClean="0"/>
-              <a:t>10/18/17</a:t>
+              <a:t>11/16/17</a:t>
             </a:fld>
             <a:endParaRPr lang="en-US"/>
           </a:p>
@@ -3459,17 +3459,7 @@
                 <a:latin typeface="Source Sans Pro Light"/>
                 <a:cs typeface="Source Sans Pro Light"/>
               </a:rPr>
-              <a:t> </a:t>
-            </a:r>
-            <a:r>
-              <a:rPr lang="en-US" dirty="0" smtClean="0">
-                <a:solidFill>
-                  <a:schemeClr val="accent1"/>
-                </a:solidFill>
-                <a:latin typeface="Source Sans Pro Light"/>
-                <a:cs typeface="Source Sans Pro Light"/>
-              </a:rPr>
-              <a:t>with </a:t>
+              <a:t> with </a:t>
             </a:r>
             <a:r>
               <a:rPr lang="en-US" dirty="0" err="1" smtClean="0">
@@ -3506,7 +3496,7 @@
                 <a:latin typeface="Source Sans Pro Light"/>
                 <a:cs typeface="Source Sans Pro Light"/>
               </a:rPr>
-              <a:t>Workflow cells, notebook workflow, and </a:t>
+              <a:t>Workflow cells, notebook workflow, </a:t>
             </a:r>
             <a:r>
               <a:rPr lang="en-US" sz="1600" dirty="0" err="1" smtClean="0">
@@ -3526,7 +3516,17 @@
                 <a:latin typeface="Source Sans Pro Light"/>
                 <a:cs typeface="Source Sans Pro Light"/>
               </a:rPr>
-              <a:t> %run and %</a:t>
+              <a:t> </a:t>
+            </a:r>
+            <a:r>
+              <a:rPr lang="en-US" sz="1600" dirty="0" smtClean="0">
+                <a:solidFill>
+                  <a:schemeClr val="accent1"/>
+                </a:solidFill>
+                <a:latin typeface="Source Sans Pro Light"/>
+                <a:cs typeface="Source Sans Pro Light"/>
+              </a:rPr>
+              <a:t>%run and %</a:t>
             </a:r>
             <a:r>
               <a:rPr lang="en-US" sz="1600" dirty="0" err="1" smtClean="0">
@@ -3537,6 +3537,26 @@
                 <a:cs typeface="Source Sans Pro Light"/>
               </a:rPr>
               <a:t>sosrun</a:t>
+            </a:r>
+            <a:r>
+              <a:rPr lang="en-US" sz="1600" dirty="0" smtClean="0">
+                <a:solidFill>
+                  <a:schemeClr val="accent1"/>
+                </a:solidFill>
+                <a:latin typeface="Source Sans Pro Light"/>
+                <a:cs typeface="Source Sans Pro Light"/>
+              </a:rPr>
+              <a:t>, and how </a:t>
+            </a:r>
+            <a:r>
+              <a:rPr lang="en-US" sz="1600" smtClean="0">
+                <a:solidFill>
+                  <a:schemeClr val="accent1"/>
+                </a:solidFill>
+                <a:latin typeface="Source Sans Pro Light"/>
+                <a:cs typeface="Source Sans Pro Light"/>
+              </a:rPr>
+              <a:t>to formalize your interactive analysis to workflows</a:t>
             </a:r>
             <a:endParaRPr lang="en-US" sz="1600" dirty="0" smtClean="0">
               <a:solidFill>
@@ -3776,7 +3796,7 @@
   <p:timing>
     <p:tnLst>
       <p:par>
-        <p:cTn xmlns:p14="http://schemas.microsoft.com/office/powerpoint/2010/main" id="1" dur="indefinite" restart="never" nodeType="tmRoot"/>
+        <p:cTn id="1" dur="indefinite" restart="never" nodeType="tmRoot"/>
       </p:par>
     </p:tnLst>
   </p:timing>

</xml_diff>